<commit_message>
ASG + LB EKS
</commit_message>
<xml_diff>
--- a/AWSPresentation1.pptx
+++ b/AWSPresentation1.pptx
@@ -22,6 +22,7 @@
     <p:sldId id="269" r:id="rId16"/>
     <p:sldId id="268" r:id="rId17"/>
     <p:sldId id="267" r:id="rId18"/>
+    <p:sldId id="273" r:id="rId19"/>
   </p:sldIdLst>
   <p:sldSz cx="12192000" cy="6858000"/>
   <p:notesSz cx="6858000" cy="9144000"/>
@@ -146,6 +147,7 @@
             <p14:sldId id="269"/>
             <p14:sldId id="268"/>
             <p14:sldId id="267"/>
+            <p14:sldId id="273"/>
           </p14:sldIdLst>
         </p14:section>
       </p14:sectionLst>
@@ -304,7 +306,7 @@
           <a:p>
             <a:fld id="{514B463D-3EF5-4A22-BC21-7B63AB95E5E7}" type="datetimeFigureOut">
               <a:rPr lang="en-US" smtClean="0"/>
-              <a:t>6/30/2020</a:t>
+              <a:t>7/1/2020</a:t>
             </a:fld>
             <a:endParaRPr lang="en-US"/>
           </a:p>
@@ -502,7 +504,7 @@
           <a:p>
             <a:fld id="{514B463D-3EF5-4A22-BC21-7B63AB95E5E7}" type="datetimeFigureOut">
               <a:rPr lang="en-US" smtClean="0"/>
-              <a:t>6/30/2020</a:t>
+              <a:t>7/1/2020</a:t>
             </a:fld>
             <a:endParaRPr lang="en-US"/>
           </a:p>
@@ -710,7 +712,7 @@
           <a:p>
             <a:fld id="{514B463D-3EF5-4A22-BC21-7B63AB95E5E7}" type="datetimeFigureOut">
               <a:rPr lang="en-US" smtClean="0"/>
-              <a:t>6/30/2020</a:t>
+              <a:t>7/1/2020</a:t>
             </a:fld>
             <a:endParaRPr lang="en-US"/>
           </a:p>
@@ -908,7 +910,7 @@
           <a:p>
             <a:fld id="{514B463D-3EF5-4A22-BC21-7B63AB95E5E7}" type="datetimeFigureOut">
               <a:rPr lang="en-US" smtClean="0"/>
-              <a:t>6/30/2020</a:t>
+              <a:t>7/1/2020</a:t>
             </a:fld>
             <a:endParaRPr lang="en-US"/>
           </a:p>
@@ -1183,7 +1185,7 @@
           <a:p>
             <a:fld id="{514B463D-3EF5-4A22-BC21-7B63AB95E5E7}" type="datetimeFigureOut">
               <a:rPr lang="en-US" smtClean="0"/>
-              <a:t>6/30/2020</a:t>
+              <a:t>7/1/2020</a:t>
             </a:fld>
             <a:endParaRPr lang="en-US"/>
           </a:p>
@@ -1448,7 +1450,7 @@
           <a:p>
             <a:fld id="{514B463D-3EF5-4A22-BC21-7B63AB95E5E7}" type="datetimeFigureOut">
               <a:rPr lang="en-US" smtClean="0"/>
-              <a:t>6/30/2020</a:t>
+              <a:t>7/1/2020</a:t>
             </a:fld>
             <a:endParaRPr lang="en-US"/>
           </a:p>
@@ -1860,7 +1862,7 @@
           <a:p>
             <a:fld id="{514B463D-3EF5-4A22-BC21-7B63AB95E5E7}" type="datetimeFigureOut">
               <a:rPr lang="en-US" smtClean="0"/>
-              <a:t>6/30/2020</a:t>
+              <a:t>7/1/2020</a:t>
             </a:fld>
             <a:endParaRPr lang="en-US"/>
           </a:p>
@@ -2001,7 +2003,7 @@
           <a:p>
             <a:fld id="{514B463D-3EF5-4A22-BC21-7B63AB95E5E7}" type="datetimeFigureOut">
               <a:rPr lang="en-US" smtClean="0"/>
-              <a:t>6/30/2020</a:t>
+              <a:t>7/1/2020</a:t>
             </a:fld>
             <a:endParaRPr lang="en-US"/>
           </a:p>
@@ -2114,7 +2116,7 @@
           <a:p>
             <a:fld id="{514B463D-3EF5-4A22-BC21-7B63AB95E5E7}" type="datetimeFigureOut">
               <a:rPr lang="en-US" smtClean="0"/>
-              <a:t>6/30/2020</a:t>
+              <a:t>7/1/2020</a:t>
             </a:fld>
             <a:endParaRPr lang="en-US"/>
           </a:p>
@@ -2425,7 +2427,7 @@
           <a:p>
             <a:fld id="{514B463D-3EF5-4A22-BC21-7B63AB95E5E7}" type="datetimeFigureOut">
               <a:rPr lang="en-US" smtClean="0"/>
-              <a:t>6/30/2020</a:t>
+              <a:t>7/1/2020</a:t>
             </a:fld>
             <a:endParaRPr lang="en-US"/>
           </a:p>
@@ -2713,7 +2715,7 @@
           <a:p>
             <a:fld id="{514B463D-3EF5-4A22-BC21-7B63AB95E5E7}" type="datetimeFigureOut">
               <a:rPr lang="en-US" smtClean="0"/>
-              <a:t>6/30/2020</a:t>
+              <a:t>7/1/2020</a:t>
             </a:fld>
             <a:endParaRPr lang="en-US"/>
           </a:p>
@@ -2954,7 +2956,7 @@
           <a:p>
             <a:fld id="{514B463D-3EF5-4A22-BC21-7B63AB95E5E7}" type="datetimeFigureOut">
               <a:rPr lang="en-US" smtClean="0"/>
-              <a:t>6/30/2020</a:t>
+              <a:t>7/1/2020</a:t>
             </a:fld>
             <a:endParaRPr lang="en-US"/>
           </a:p>
@@ -11872,7 +11874,7 @@
         </p:nvGrpSpPr>
         <p:grpSpPr>
           <a:xfrm>
-            <a:off x="7176655" y="4232563"/>
+            <a:off x="6867237" y="4253346"/>
             <a:ext cx="2484581" cy="2521527"/>
             <a:chOff x="7176655" y="4232563"/>
             <a:chExt cx="2484581" cy="2521527"/>
@@ -12019,302 +12021,6 @@
       </p:grpSp>
       <p:grpSp>
         <p:nvGrpSpPr>
-          <p:cNvPr id="9" name="Group 8">
-            <a:extLst>
-              <a:ext uri="{FF2B5EF4-FFF2-40B4-BE49-F238E27FC236}">
-                <a16:creationId xmlns:a16="http://schemas.microsoft.com/office/drawing/2014/main" id="{8EDDE38E-3FBA-457D-8A4A-6E6F6F3F1BB2}"/>
-              </a:ext>
-            </a:extLst>
-          </p:cNvPr>
-          <p:cNvGrpSpPr/>
-          <p:nvPr/>
-        </p:nvGrpSpPr>
-        <p:grpSpPr>
-          <a:xfrm>
-            <a:off x="4170220" y="4232563"/>
-            <a:ext cx="2484581" cy="2521527"/>
-            <a:chOff x="4202547" y="4257963"/>
-            <a:chExt cx="2484581" cy="2521527"/>
-          </a:xfrm>
-        </p:grpSpPr>
-        <p:sp>
-          <p:nvSpPr>
-            <p:cNvPr id="23" name="Rectangle 22">
-              <a:extLst>
-                <a:ext uri="{FF2B5EF4-FFF2-40B4-BE49-F238E27FC236}">
-                  <a16:creationId xmlns:a16="http://schemas.microsoft.com/office/drawing/2014/main" id="{12C3CBAB-D567-4A0B-8717-B93737E2072D}"/>
-                </a:ext>
-              </a:extLst>
-            </p:cNvPr>
-            <p:cNvSpPr/>
-            <p:nvPr/>
-          </p:nvSpPr>
-          <p:spPr>
-            <a:xfrm>
-              <a:off x="4202547" y="4257963"/>
-              <a:ext cx="2484581" cy="2521527"/>
-            </a:xfrm>
-            <a:prstGeom prst="rect">
-              <a:avLst/>
-            </a:prstGeom>
-          </p:spPr>
-          <p:style>
-            <a:lnRef idx="2">
-              <a:schemeClr val="accent1">
-                <a:shade val="50000"/>
-              </a:schemeClr>
-            </a:lnRef>
-            <a:fillRef idx="1">
-              <a:schemeClr val="accent1"/>
-            </a:fillRef>
-            <a:effectRef idx="0">
-              <a:schemeClr val="accent1"/>
-            </a:effectRef>
-            <a:fontRef idx="minor">
-              <a:schemeClr val="lt1"/>
-            </a:fontRef>
-          </p:style>
-          <p:txBody>
-            <a:bodyPr rtlCol="0" anchor="ctr"/>
-            <a:lstStyle/>
-            <a:p>
-              <a:pPr algn="ctr"/>
-              <a:endParaRPr lang="en-US"/>
-            </a:p>
-          </p:txBody>
-        </p:sp>
-        <p:sp>
-          <p:nvSpPr>
-            <p:cNvPr id="25" name="Rectangle 24">
-              <a:extLst>
-                <a:ext uri="{FF2B5EF4-FFF2-40B4-BE49-F238E27FC236}">
-                  <a16:creationId xmlns:a16="http://schemas.microsoft.com/office/drawing/2014/main" id="{4ABE5095-0BB2-4293-BCB1-C03A07B0A4DB}"/>
-                </a:ext>
-              </a:extLst>
-            </p:cNvPr>
-            <p:cNvSpPr/>
-            <p:nvPr/>
-          </p:nvSpPr>
-          <p:spPr>
-            <a:xfrm>
-              <a:off x="4230256" y="4408053"/>
-              <a:ext cx="2429163" cy="1346201"/>
-            </a:xfrm>
-            <a:prstGeom prst="rect">
-              <a:avLst/>
-            </a:prstGeom>
-          </p:spPr>
-          <p:style>
-            <a:lnRef idx="2">
-              <a:schemeClr val="accent6">
-                <a:shade val="50000"/>
-              </a:schemeClr>
-            </a:lnRef>
-            <a:fillRef idx="1">
-              <a:schemeClr val="accent6"/>
-            </a:fillRef>
-            <a:effectRef idx="0">
-              <a:schemeClr val="accent6"/>
-            </a:effectRef>
-            <a:fontRef idx="minor">
-              <a:schemeClr val="lt1"/>
-            </a:fontRef>
-          </p:style>
-          <p:txBody>
-            <a:bodyPr rtlCol="0" anchor="ctr"/>
-            <a:lstStyle/>
-            <a:p>
-              <a:pPr algn="ctr"/>
-              <a:endParaRPr lang="en-US"/>
-            </a:p>
-          </p:txBody>
-        </p:sp>
-        <p:sp>
-          <p:nvSpPr>
-            <p:cNvPr id="19" name="Rectangle 18">
-              <a:extLst>
-                <a:ext uri="{FF2B5EF4-FFF2-40B4-BE49-F238E27FC236}">
-                  <a16:creationId xmlns:a16="http://schemas.microsoft.com/office/drawing/2014/main" id="{2C39E524-ABDA-41B8-A61E-A6F8D5D5E543}"/>
-                </a:ext>
-              </a:extLst>
-            </p:cNvPr>
-            <p:cNvSpPr/>
-            <p:nvPr/>
-          </p:nvSpPr>
-          <p:spPr>
-            <a:xfrm>
-              <a:off x="4354946" y="4602017"/>
-              <a:ext cx="1043709" cy="914400"/>
-            </a:xfrm>
-            <a:prstGeom prst="rect">
-              <a:avLst/>
-            </a:prstGeom>
-          </p:spPr>
-          <p:style>
-            <a:lnRef idx="2">
-              <a:schemeClr val="accent4">
-                <a:shade val="50000"/>
-              </a:schemeClr>
-            </a:lnRef>
-            <a:fillRef idx="1">
-              <a:schemeClr val="accent4"/>
-            </a:fillRef>
-            <a:effectRef idx="0">
-              <a:schemeClr val="accent4"/>
-            </a:effectRef>
-            <a:fontRef idx="minor">
-              <a:schemeClr val="lt1"/>
-            </a:fontRef>
-          </p:style>
-          <p:txBody>
-            <a:bodyPr rtlCol="0" anchor="ctr"/>
-            <a:lstStyle/>
-            <a:p>
-              <a:pPr algn="ctr"/>
-              <a:endParaRPr lang="en-US"/>
-            </a:p>
-          </p:txBody>
-        </p:sp>
-        <p:sp>
-          <p:nvSpPr>
-            <p:cNvPr id="20" name="Rectangle 19">
-              <a:extLst>
-                <a:ext uri="{FF2B5EF4-FFF2-40B4-BE49-F238E27FC236}">
-                  <a16:creationId xmlns:a16="http://schemas.microsoft.com/office/drawing/2014/main" id="{BB16DEE3-D2E6-4C05-BCDE-B375A610CDB2}"/>
-                </a:ext>
-              </a:extLst>
-            </p:cNvPr>
-            <p:cNvSpPr/>
-            <p:nvPr/>
-          </p:nvSpPr>
-          <p:spPr>
-            <a:xfrm>
-              <a:off x="5523345" y="4588163"/>
-              <a:ext cx="1043709" cy="914400"/>
-            </a:xfrm>
-            <a:prstGeom prst="rect">
-              <a:avLst/>
-            </a:prstGeom>
-          </p:spPr>
-          <p:style>
-            <a:lnRef idx="2">
-              <a:schemeClr val="accent4">
-                <a:shade val="50000"/>
-              </a:schemeClr>
-            </a:lnRef>
-            <a:fillRef idx="1">
-              <a:schemeClr val="accent4"/>
-            </a:fillRef>
-            <a:effectRef idx="0">
-              <a:schemeClr val="accent4"/>
-            </a:effectRef>
-            <a:fontRef idx="minor">
-              <a:schemeClr val="lt1"/>
-            </a:fontRef>
-          </p:style>
-          <p:txBody>
-            <a:bodyPr rtlCol="0" anchor="ctr"/>
-            <a:lstStyle/>
-            <a:p>
-              <a:pPr algn="ctr"/>
-              <a:endParaRPr lang="en-US"/>
-            </a:p>
-          </p:txBody>
-        </p:sp>
-      </p:grpSp>
-      <p:cxnSp>
-        <p:nvCxnSpPr>
-          <p:cNvPr id="3" name="Connector: Elbow 2">
-            <a:extLst>
-              <a:ext uri="{FF2B5EF4-FFF2-40B4-BE49-F238E27FC236}">
-                <a16:creationId xmlns:a16="http://schemas.microsoft.com/office/drawing/2014/main" id="{AF5BCA5F-A1A4-4520-B79B-F8C1340C89D4}"/>
-              </a:ext>
-            </a:extLst>
-          </p:cNvPr>
-          <p:cNvCxnSpPr>
-            <a:endCxn id="23" idx="1"/>
-          </p:cNvCxnSpPr>
-          <p:nvPr/>
-        </p:nvCxnSpPr>
-        <p:spPr>
-          <a:xfrm>
-            <a:off x="180111" y="5477163"/>
-            <a:ext cx="3990109" cy="16164"/>
-          </a:xfrm>
-          <a:prstGeom prst="bentConnector3">
-            <a:avLst/>
-          </a:prstGeom>
-          <a:ln>
-            <a:tailEnd type="triangle"/>
-          </a:ln>
-        </p:spPr>
-        <p:style>
-          <a:lnRef idx="1">
-            <a:schemeClr val="accent1"/>
-          </a:lnRef>
-          <a:fillRef idx="0">
-            <a:schemeClr val="accent1"/>
-          </a:fillRef>
-          <a:effectRef idx="0">
-            <a:schemeClr val="accent1"/>
-          </a:effectRef>
-          <a:fontRef idx="minor">
-            <a:schemeClr val="tx1"/>
-          </a:fontRef>
-        </p:style>
-      </p:cxnSp>
-      <p:sp>
-        <p:nvSpPr>
-          <p:cNvPr id="5" name="Rectangle 4">
-            <a:extLst>
-              <a:ext uri="{FF2B5EF4-FFF2-40B4-BE49-F238E27FC236}">
-                <a16:creationId xmlns:a16="http://schemas.microsoft.com/office/drawing/2014/main" id="{515F0664-2FFD-40FE-B1F6-34227D71D9C6}"/>
-              </a:ext>
-            </a:extLst>
-          </p:cNvPr>
-          <p:cNvSpPr/>
-          <p:nvPr/>
-        </p:nvSpPr>
-        <p:spPr>
-          <a:xfrm>
-            <a:off x="840509" y="4655127"/>
-            <a:ext cx="2272146" cy="1514764"/>
-          </a:xfrm>
-          <a:prstGeom prst="rect">
-            <a:avLst/>
-          </a:prstGeom>
-        </p:spPr>
-        <p:style>
-          <a:lnRef idx="2">
-            <a:schemeClr val="accent1">
-              <a:shade val="50000"/>
-            </a:schemeClr>
-          </a:lnRef>
-          <a:fillRef idx="1">
-            <a:schemeClr val="accent1"/>
-          </a:fillRef>
-          <a:effectRef idx="0">
-            <a:schemeClr val="accent1"/>
-          </a:effectRef>
-          <a:fontRef idx="minor">
-            <a:schemeClr val="lt1"/>
-          </a:fontRef>
-        </p:style>
-        <p:txBody>
-          <a:bodyPr rtlCol="0" anchor="ctr"/>
-          <a:lstStyle/>
-          <a:p>
-            <a:pPr algn="ctr"/>
-            <a:r>
-              <a:rPr lang="en-US" dirty="0" err="1"/>
-              <a:t>Puttt</a:t>
-            </a:r>
-            <a:endParaRPr lang="en-US" dirty="0"/>
-          </a:p>
-        </p:txBody>
-      </p:sp>
-      <p:grpSp>
-        <p:nvGrpSpPr>
           <p:cNvPr id="26" name="Group 25">
             <a:extLst>
               <a:ext uri="{FF2B5EF4-FFF2-40B4-BE49-F238E27FC236}">
@@ -12472,10 +12178,1453 @@
           </p:txBody>
         </p:sp>
       </p:grpSp>
+      <p:sp>
+        <p:nvSpPr>
+          <p:cNvPr id="2" name="Rectangle 1">
+            <a:extLst>
+              <a:ext uri="{FF2B5EF4-FFF2-40B4-BE49-F238E27FC236}">
+                <a16:creationId xmlns:a16="http://schemas.microsoft.com/office/drawing/2014/main" id="{287EB7D7-81CE-49A5-9619-4C2727A5F49F}"/>
+              </a:ext>
+            </a:extLst>
+          </p:cNvPr>
+          <p:cNvSpPr/>
+          <p:nvPr/>
+        </p:nvSpPr>
+        <p:spPr>
+          <a:xfrm>
+            <a:off x="2761673" y="4849554"/>
+            <a:ext cx="4304145" cy="45719"/>
+          </a:xfrm>
+          <a:prstGeom prst="rect">
+            <a:avLst/>
+          </a:prstGeom>
+        </p:spPr>
+        <p:style>
+          <a:lnRef idx="2">
+            <a:schemeClr val="accent1">
+              <a:shade val="50000"/>
+            </a:schemeClr>
+          </a:lnRef>
+          <a:fillRef idx="1">
+            <a:schemeClr val="accent1"/>
+          </a:fillRef>
+          <a:effectRef idx="0">
+            <a:schemeClr val="accent1"/>
+          </a:effectRef>
+          <a:fontRef idx="minor">
+            <a:schemeClr val="lt1"/>
+          </a:fontRef>
+        </p:style>
+        <p:txBody>
+          <a:bodyPr rtlCol="0" anchor="ctr"/>
+          <a:lstStyle/>
+          <a:p>
+            <a:pPr algn="ctr"/>
+            <a:endParaRPr lang="en-US"/>
+          </a:p>
+        </p:txBody>
+      </p:sp>
+      <p:sp>
+        <p:nvSpPr>
+          <p:cNvPr id="15" name="Rectangle 14">
+            <a:extLst>
+              <a:ext uri="{FF2B5EF4-FFF2-40B4-BE49-F238E27FC236}">
+                <a16:creationId xmlns:a16="http://schemas.microsoft.com/office/drawing/2014/main" id="{968A01C2-F2A4-4CCF-A2FC-E4011D6CC182}"/>
+              </a:ext>
+            </a:extLst>
+          </p:cNvPr>
+          <p:cNvSpPr/>
+          <p:nvPr/>
+        </p:nvSpPr>
+        <p:spPr>
+          <a:xfrm>
+            <a:off x="2512291" y="4274128"/>
+            <a:ext cx="434107" cy="1424708"/>
+          </a:xfrm>
+          <a:prstGeom prst="rect">
+            <a:avLst/>
+          </a:prstGeom>
+        </p:spPr>
+        <p:style>
+          <a:lnRef idx="2">
+            <a:schemeClr val="accent1">
+              <a:shade val="50000"/>
+            </a:schemeClr>
+          </a:lnRef>
+          <a:fillRef idx="1">
+            <a:schemeClr val="accent1"/>
+          </a:fillRef>
+          <a:effectRef idx="0">
+            <a:schemeClr val="accent1"/>
+          </a:effectRef>
+          <a:fontRef idx="minor">
+            <a:schemeClr val="lt1"/>
+          </a:fontRef>
+        </p:style>
+        <p:txBody>
+          <a:bodyPr rtlCol="0" anchor="ctr"/>
+          <a:lstStyle/>
+          <a:p>
+            <a:pPr algn="ctr"/>
+            <a:endParaRPr lang="en-US"/>
+          </a:p>
+        </p:txBody>
+      </p:sp>
+      <p:cxnSp>
+        <p:nvCxnSpPr>
+          <p:cNvPr id="30" name="Straight Arrow Connector 29">
+            <a:extLst>
+              <a:ext uri="{FF2B5EF4-FFF2-40B4-BE49-F238E27FC236}">
+                <a16:creationId xmlns:a16="http://schemas.microsoft.com/office/drawing/2014/main" id="{5251C05D-3196-485D-90CC-95845CD269BA}"/>
+              </a:ext>
+            </a:extLst>
+          </p:cNvPr>
+          <p:cNvCxnSpPr/>
+          <p:nvPr/>
+        </p:nvCxnSpPr>
+        <p:spPr>
+          <a:xfrm>
+            <a:off x="609600" y="5025045"/>
+            <a:ext cx="1985818" cy="0"/>
+          </a:xfrm>
+          <a:prstGeom prst="straightConnector1">
+            <a:avLst/>
+          </a:prstGeom>
+          <a:ln>
+            <a:tailEnd type="triangle"/>
+          </a:ln>
+        </p:spPr>
+        <p:style>
+          <a:lnRef idx="1">
+            <a:schemeClr val="accent1"/>
+          </a:lnRef>
+          <a:fillRef idx="0">
+            <a:schemeClr val="accent1"/>
+          </a:fillRef>
+          <a:effectRef idx="0">
+            <a:schemeClr val="accent1"/>
+          </a:effectRef>
+          <a:fontRef idx="minor">
+            <a:schemeClr val="tx1"/>
+          </a:fontRef>
+        </p:style>
+      </p:cxnSp>
     </p:spTree>
     <p:extLst>
       <p:ext uri="{BB962C8B-B14F-4D97-AF65-F5344CB8AC3E}">
         <p14:creationId xmlns:p14="http://schemas.microsoft.com/office/powerpoint/2010/main" val="1149983128"/>
+      </p:ext>
+    </p:extLst>
+  </p:cSld>
+  <p:clrMapOvr>
+    <a:masterClrMapping/>
+  </p:clrMapOvr>
+</p:sld>
+</file>
+
+<file path=ppt/slides/slide18.xml><?xml version="1.0" encoding="utf-8"?>
+<p:sld xmlns:a="http://schemas.openxmlformats.org/drawingml/2006/main" xmlns:r="http://schemas.openxmlformats.org/officeDocument/2006/relationships" xmlns:p="http://schemas.openxmlformats.org/presentationml/2006/main">
+  <p:cSld>
+    <p:spTree>
+      <p:nvGrpSpPr>
+        <p:cNvPr id="1" name=""/>
+        <p:cNvGrpSpPr/>
+        <p:nvPr/>
+      </p:nvGrpSpPr>
+      <p:grpSpPr>
+        <a:xfrm>
+          <a:off x="0" y="0"/>
+          <a:ext cx="0" cy="0"/>
+          <a:chOff x="0" y="0"/>
+          <a:chExt cx="0" cy="0"/>
+        </a:xfrm>
+      </p:grpSpPr>
+      <p:sp>
+        <p:nvSpPr>
+          <p:cNvPr id="4" name="Rectangle 3">
+            <a:extLst>
+              <a:ext uri="{FF2B5EF4-FFF2-40B4-BE49-F238E27FC236}">
+                <a16:creationId xmlns:a16="http://schemas.microsoft.com/office/drawing/2014/main" id="{A035D121-71A0-4615-A334-5E42FDB90715}"/>
+              </a:ext>
+            </a:extLst>
+          </p:cNvPr>
+          <p:cNvSpPr/>
+          <p:nvPr/>
+        </p:nvSpPr>
+        <p:spPr>
+          <a:xfrm>
+            <a:off x="7758545" y="387927"/>
+            <a:ext cx="3953164" cy="1431637"/>
+          </a:xfrm>
+          <a:prstGeom prst="rect">
+            <a:avLst/>
+          </a:prstGeom>
+        </p:spPr>
+        <p:style>
+          <a:lnRef idx="2">
+            <a:schemeClr val="accent1">
+              <a:shade val="50000"/>
+            </a:schemeClr>
+          </a:lnRef>
+          <a:fillRef idx="1">
+            <a:schemeClr val="accent1"/>
+          </a:fillRef>
+          <a:effectRef idx="0">
+            <a:schemeClr val="accent1"/>
+          </a:effectRef>
+          <a:fontRef idx="minor">
+            <a:schemeClr val="lt1"/>
+          </a:fontRef>
+        </p:style>
+        <p:txBody>
+          <a:bodyPr rtlCol="0" anchor="ctr"/>
+          <a:lstStyle/>
+          <a:p>
+            <a:pPr algn="ctr"/>
+            <a:r>
+              <a:rPr lang="en-US" sz="1600" dirty="0"/>
+              <a:t>Master</a:t>
+            </a:r>
+          </a:p>
+        </p:txBody>
+      </p:sp>
+      <p:sp>
+        <p:nvSpPr>
+          <p:cNvPr id="5" name="Rectangle 4">
+            <a:extLst>
+              <a:ext uri="{FF2B5EF4-FFF2-40B4-BE49-F238E27FC236}">
+                <a16:creationId xmlns:a16="http://schemas.microsoft.com/office/drawing/2014/main" id="{7A361F59-83A6-4D2F-86C6-8C54AD4182CD}"/>
+              </a:ext>
+            </a:extLst>
+          </p:cNvPr>
+          <p:cNvSpPr/>
+          <p:nvPr/>
+        </p:nvSpPr>
+        <p:spPr>
+          <a:xfrm>
+            <a:off x="7758545" y="2419927"/>
+            <a:ext cx="1727200" cy="1431637"/>
+          </a:xfrm>
+          <a:prstGeom prst="rect">
+            <a:avLst/>
+          </a:prstGeom>
+        </p:spPr>
+        <p:style>
+          <a:lnRef idx="2">
+            <a:schemeClr val="accent1">
+              <a:shade val="50000"/>
+            </a:schemeClr>
+          </a:lnRef>
+          <a:fillRef idx="1">
+            <a:schemeClr val="accent1"/>
+          </a:fillRef>
+          <a:effectRef idx="0">
+            <a:schemeClr val="accent1"/>
+          </a:effectRef>
+          <a:fontRef idx="minor">
+            <a:schemeClr val="lt1"/>
+          </a:fontRef>
+        </p:style>
+        <p:txBody>
+          <a:bodyPr rtlCol="0" anchor="ctr"/>
+          <a:lstStyle/>
+          <a:p>
+            <a:pPr algn="ctr"/>
+            <a:r>
+              <a:rPr lang="en-US" sz="1600" dirty="0"/>
+              <a:t>Node01</a:t>
+            </a:r>
+          </a:p>
+        </p:txBody>
+      </p:sp>
+      <p:sp>
+        <p:nvSpPr>
+          <p:cNvPr id="6" name="Rectangle 5">
+            <a:extLst>
+              <a:ext uri="{FF2B5EF4-FFF2-40B4-BE49-F238E27FC236}">
+                <a16:creationId xmlns:a16="http://schemas.microsoft.com/office/drawing/2014/main" id="{A9A2846A-80C8-4FDF-8B35-0733B470CA81}"/>
+              </a:ext>
+            </a:extLst>
+          </p:cNvPr>
+          <p:cNvSpPr/>
+          <p:nvPr/>
+        </p:nvSpPr>
+        <p:spPr>
+          <a:xfrm>
+            <a:off x="9984509" y="2419926"/>
+            <a:ext cx="1727200" cy="1431637"/>
+          </a:xfrm>
+          <a:prstGeom prst="rect">
+            <a:avLst/>
+          </a:prstGeom>
+        </p:spPr>
+        <p:style>
+          <a:lnRef idx="2">
+            <a:schemeClr val="accent1">
+              <a:shade val="50000"/>
+            </a:schemeClr>
+          </a:lnRef>
+          <a:fillRef idx="1">
+            <a:schemeClr val="accent1"/>
+          </a:fillRef>
+          <a:effectRef idx="0">
+            <a:schemeClr val="accent1"/>
+          </a:effectRef>
+          <a:fontRef idx="minor">
+            <a:schemeClr val="lt1"/>
+          </a:fontRef>
+        </p:style>
+        <p:txBody>
+          <a:bodyPr rtlCol="0" anchor="ctr"/>
+          <a:lstStyle/>
+          <a:p>
+            <a:pPr algn="ctr"/>
+            <a:r>
+              <a:rPr lang="en-US" sz="1600" dirty="0"/>
+              <a:t>Node2</a:t>
+            </a:r>
+          </a:p>
+        </p:txBody>
+      </p:sp>
+      <p:cxnSp>
+        <p:nvCxnSpPr>
+          <p:cNvPr id="8" name="Connector: Elbow 7">
+            <a:extLst>
+              <a:ext uri="{FF2B5EF4-FFF2-40B4-BE49-F238E27FC236}">
+                <a16:creationId xmlns:a16="http://schemas.microsoft.com/office/drawing/2014/main" id="{03794F53-31DD-4147-9B64-21A23C1CCC7D}"/>
+              </a:ext>
+            </a:extLst>
+          </p:cNvPr>
+          <p:cNvCxnSpPr>
+            <a:stCxn id="4" idx="2"/>
+            <a:endCxn id="5" idx="0"/>
+          </p:cNvCxnSpPr>
+          <p:nvPr/>
+        </p:nvCxnSpPr>
+        <p:spPr>
+          <a:xfrm rot="5400000">
+            <a:off x="8878455" y="1563254"/>
+            <a:ext cx="600363" cy="1112982"/>
+          </a:xfrm>
+          <a:prstGeom prst="bentConnector3">
+            <a:avLst/>
+          </a:prstGeom>
+          <a:ln>
+            <a:tailEnd type="triangle"/>
+          </a:ln>
+        </p:spPr>
+        <p:style>
+          <a:lnRef idx="1">
+            <a:schemeClr val="accent1"/>
+          </a:lnRef>
+          <a:fillRef idx="0">
+            <a:schemeClr val="accent1"/>
+          </a:fillRef>
+          <a:effectRef idx="0">
+            <a:schemeClr val="accent1"/>
+          </a:effectRef>
+          <a:fontRef idx="minor">
+            <a:schemeClr val="tx1"/>
+          </a:fontRef>
+        </p:style>
+      </p:cxnSp>
+      <p:cxnSp>
+        <p:nvCxnSpPr>
+          <p:cNvPr id="10" name="Connector: Elbow 9">
+            <a:extLst>
+              <a:ext uri="{FF2B5EF4-FFF2-40B4-BE49-F238E27FC236}">
+                <a16:creationId xmlns:a16="http://schemas.microsoft.com/office/drawing/2014/main" id="{8E3CF102-08A3-4DCB-9AE9-970406D4E0B0}"/>
+              </a:ext>
+            </a:extLst>
+          </p:cNvPr>
+          <p:cNvCxnSpPr>
+            <a:stCxn id="4" idx="2"/>
+            <a:endCxn id="6" idx="0"/>
+          </p:cNvCxnSpPr>
+          <p:nvPr/>
+        </p:nvCxnSpPr>
+        <p:spPr>
+          <a:xfrm rot="16200000" flipH="1">
+            <a:off x="9991437" y="1563254"/>
+            <a:ext cx="600362" cy="1112982"/>
+          </a:xfrm>
+          <a:prstGeom prst="bentConnector3">
+            <a:avLst/>
+          </a:prstGeom>
+          <a:ln>
+            <a:tailEnd type="triangle"/>
+          </a:ln>
+        </p:spPr>
+        <p:style>
+          <a:lnRef idx="1">
+            <a:schemeClr val="accent1"/>
+          </a:lnRef>
+          <a:fillRef idx="0">
+            <a:schemeClr val="accent1"/>
+          </a:fillRef>
+          <a:effectRef idx="0">
+            <a:schemeClr val="accent1"/>
+          </a:effectRef>
+          <a:fontRef idx="minor">
+            <a:schemeClr val="tx1"/>
+          </a:fontRef>
+        </p:style>
+      </p:cxnSp>
+      <p:sp>
+        <p:nvSpPr>
+          <p:cNvPr id="11" name="Rectangle 10">
+            <a:extLst>
+              <a:ext uri="{FF2B5EF4-FFF2-40B4-BE49-F238E27FC236}">
+                <a16:creationId xmlns:a16="http://schemas.microsoft.com/office/drawing/2014/main" id="{63B690C4-66D6-40A1-8B31-CF0DC701323C}"/>
+              </a:ext>
+            </a:extLst>
+          </p:cNvPr>
+          <p:cNvSpPr/>
+          <p:nvPr/>
+        </p:nvSpPr>
+        <p:spPr>
+          <a:xfrm>
+            <a:off x="7758545" y="3909291"/>
+            <a:ext cx="1727200" cy="163945"/>
+          </a:xfrm>
+          <a:prstGeom prst="rect">
+            <a:avLst/>
+          </a:prstGeom>
+        </p:spPr>
+        <p:style>
+          <a:lnRef idx="2">
+            <a:schemeClr val="accent6">
+              <a:shade val="50000"/>
+            </a:schemeClr>
+          </a:lnRef>
+          <a:fillRef idx="1">
+            <a:schemeClr val="accent6"/>
+          </a:fillRef>
+          <a:effectRef idx="0">
+            <a:schemeClr val="accent6"/>
+          </a:effectRef>
+          <a:fontRef idx="minor">
+            <a:schemeClr val="lt1"/>
+          </a:fontRef>
+        </p:style>
+        <p:txBody>
+          <a:bodyPr rtlCol="0" anchor="ctr"/>
+          <a:lstStyle/>
+          <a:p>
+            <a:pPr algn="ctr"/>
+            <a:endParaRPr lang="en-US" sz="1600"/>
+          </a:p>
+        </p:txBody>
+      </p:sp>
+      <p:sp>
+        <p:nvSpPr>
+          <p:cNvPr id="12" name="Rectangle 11">
+            <a:extLst>
+              <a:ext uri="{FF2B5EF4-FFF2-40B4-BE49-F238E27FC236}">
+                <a16:creationId xmlns:a16="http://schemas.microsoft.com/office/drawing/2014/main" id="{20BC9E8B-8678-449C-8C84-640EA45C5D21}"/>
+              </a:ext>
+            </a:extLst>
+          </p:cNvPr>
+          <p:cNvSpPr/>
+          <p:nvPr/>
+        </p:nvSpPr>
+        <p:spPr>
+          <a:xfrm>
+            <a:off x="8880763" y="4434614"/>
+            <a:ext cx="1727200" cy="163945"/>
+          </a:xfrm>
+          <a:prstGeom prst="rect">
+            <a:avLst/>
+          </a:prstGeom>
+        </p:spPr>
+        <p:style>
+          <a:lnRef idx="2">
+            <a:schemeClr val="accent6">
+              <a:shade val="50000"/>
+            </a:schemeClr>
+          </a:lnRef>
+          <a:fillRef idx="1">
+            <a:schemeClr val="accent6"/>
+          </a:fillRef>
+          <a:effectRef idx="0">
+            <a:schemeClr val="accent6"/>
+          </a:effectRef>
+          <a:fontRef idx="minor">
+            <a:schemeClr val="lt1"/>
+          </a:fontRef>
+        </p:style>
+        <p:txBody>
+          <a:bodyPr rtlCol="0" anchor="ctr"/>
+          <a:lstStyle/>
+          <a:p>
+            <a:pPr algn="ctr"/>
+            <a:endParaRPr lang="en-US" sz="1600"/>
+          </a:p>
+        </p:txBody>
+      </p:sp>
+      <p:sp>
+        <p:nvSpPr>
+          <p:cNvPr id="14" name="Rectangle 13">
+            <a:extLst>
+              <a:ext uri="{FF2B5EF4-FFF2-40B4-BE49-F238E27FC236}">
+                <a16:creationId xmlns:a16="http://schemas.microsoft.com/office/drawing/2014/main" id="{6C6E85AF-10E8-4D0B-A071-53D60B717290}"/>
+              </a:ext>
+            </a:extLst>
+          </p:cNvPr>
+          <p:cNvSpPr/>
+          <p:nvPr/>
+        </p:nvSpPr>
+        <p:spPr>
+          <a:xfrm>
+            <a:off x="7758544" y="166255"/>
+            <a:ext cx="3953163" cy="163944"/>
+          </a:xfrm>
+          <a:prstGeom prst="rect">
+            <a:avLst/>
+          </a:prstGeom>
+        </p:spPr>
+        <p:style>
+          <a:lnRef idx="2">
+            <a:schemeClr val="accent6">
+              <a:shade val="50000"/>
+            </a:schemeClr>
+          </a:lnRef>
+          <a:fillRef idx="1">
+            <a:schemeClr val="accent6"/>
+          </a:fillRef>
+          <a:effectRef idx="0">
+            <a:schemeClr val="accent6"/>
+          </a:effectRef>
+          <a:fontRef idx="minor">
+            <a:schemeClr val="lt1"/>
+          </a:fontRef>
+        </p:style>
+        <p:txBody>
+          <a:bodyPr rtlCol="0" anchor="ctr"/>
+          <a:lstStyle/>
+          <a:p>
+            <a:pPr algn="ctr"/>
+            <a:endParaRPr lang="en-US" sz="1600"/>
+          </a:p>
+        </p:txBody>
+      </p:sp>
+      <p:sp>
+        <p:nvSpPr>
+          <p:cNvPr id="17" name="TextBox 16">
+            <a:extLst>
+              <a:ext uri="{FF2B5EF4-FFF2-40B4-BE49-F238E27FC236}">
+                <a16:creationId xmlns:a16="http://schemas.microsoft.com/office/drawing/2014/main" id="{90F73247-5588-49EF-B4B1-D9E2237A59DB}"/>
+              </a:ext>
+            </a:extLst>
+          </p:cNvPr>
+          <p:cNvSpPr txBox="1"/>
+          <p:nvPr/>
+        </p:nvSpPr>
+        <p:spPr>
+          <a:xfrm>
+            <a:off x="212436" y="387927"/>
+            <a:ext cx="2272146" cy="338554"/>
+          </a:xfrm>
+          <a:prstGeom prst="rect">
+            <a:avLst/>
+          </a:prstGeom>
+          <a:noFill/>
+        </p:spPr>
+        <p:txBody>
+          <a:bodyPr wrap="square" rtlCol="0">
+            <a:spAutoFit/>
+          </a:bodyPr>
+          <a:lstStyle/>
+          <a:p>
+            <a:r>
+              <a:rPr lang="en-US" sz="1600" dirty="0" err="1"/>
+              <a:t>kubectl</a:t>
+            </a:r>
+            <a:endParaRPr lang="en-US" sz="1600" dirty="0"/>
+          </a:p>
+        </p:txBody>
+      </p:sp>
+      <p:cxnSp>
+        <p:nvCxnSpPr>
+          <p:cNvPr id="19" name="Connector: Elbow 18">
+            <a:extLst>
+              <a:ext uri="{FF2B5EF4-FFF2-40B4-BE49-F238E27FC236}">
+                <a16:creationId xmlns:a16="http://schemas.microsoft.com/office/drawing/2014/main" id="{6B24C455-E635-4363-A0BA-70A19A51EC15}"/>
+              </a:ext>
+            </a:extLst>
+          </p:cNvPr>
+          <p:cNvCxnSpPr>
+            <a:endCxn id="14" idx="1"/>
+          </p:cNvCxnSpPr>
+          <p:nvPr/>
+        </p:nvCxnSpPr>
+        <p:spPr>
+          <a:xfrm flipV="1">
+            <a:off x="997527" y="248227"/>
+            <a:ext cx="6761017" cy="287482"/>
+          </a:xfrm>
+          <a:prstGeom prst="bentConnector3">
+            <a:avLst/>
+          </a:prstGeom>
+          <a:ln>
+            <a:tailEnd type="triangle"/>
+          </a:ln>
+        </p:spPr>
+        <p:style>
+          <a:lnRef idx="1">
+            <a:schemeClr val="accent1"/>
+          </a:lnRef>
+          <a:fillRef idx="0">
+            <a:schemeClr val="accent1"/>
+          </a:fillRef>
+          <a:effectRef idx="0">
+            <a:schemeClr val="accent1"/>
+          </a:effectRef>
+          <a:fontRef idx="minor">
+            <a:schemeClr val="tx1"/>
+          </a:fontRef>
+        </p:style>
+      </p:cxnSp>
+      <p:sp>
+        <p:nvSpPr>
+          <p:cNvPr id="20" name="Rectangle: Rounded Corners 19">
+            <a:extLst>
+              <a:ext uri="{FF2B5EF4-FFF2-40B4-BE49-F238E27FC236}">
+                <a16:creationId xmlns:a16="http://schemas.microsoft.com/office/drawing/2014/main" id="{3F2DB8AF-9569-46A2-8B19-8B8F72900581}"/>
+              </a:ext>
+            </a:extLst>
+          </p:cNvPr>
+          <p:cNvSpPr/>
+          <p:nvPr/>
+        </p:nvSpPr>
+        <p:spPr>
+          <a:xfrm>
+            <a:off x="8446654" y="1729508"/>
+            <a:ext cx="2595418" cy="780474"/>
+          </a:xfrm>
+          <a:prstGeom prst="roundRect">
+            <a:avLst/>
+          </a:prstGeom>
+        </p:spPr>
+        <p:style>
+          <a:lnRef idx="2">
+            <a:schemeClr val="accent4">
+              <a:shade val="50000"/>
+            </a:schemeClr>
+          </a:lnRef>
+          <a:fillRef idx="1">
+            <a:schemeClr val="accent4"/>
+          </a:fillRef>
+          <a:effectRef idx="0">
+            <a:schemeClr val="accent4"/>
+          </a:effectRef>
+          <a:fontRef idx="minor">
+            <a:schemeClr val="lt1"/>
+          </a:fontRef>
+        </p:style>
+        <p:txBody>
+          <a:bodyPr rtlCol="0" anchor="ctr"/>
+          <a:lstStyle/>
+          <a:p>
+            <a:pPr algn="ctr"/>
+            <a:r>
+              <a:rPr lang="en-US" sz="1600" dirty="0"/>
+              <a:t>CNI (</a:t>
+            </a:r>
+            <a:r>
+              <a:rPr lang="en-US" sz="1600" dirty="0" err="1"/>
+              <a:t>Clusterip</a:t>
+            </a:r>
+            <a:r>
+              <a:rPr lang="en-US" sz="1600" dirty="0"/>
+              <a:t>)</a:t>
+            </a:r>
+          </a:p>
+        </p:txBody>
+      </p:sp>
+      <p:sp>
+        <p:nvSpPr>
+          <p:cNvPr id="21" name="Rectangle 20">
+            <a:extLst>
+              <a:ext uri="{FF2B5EF4-FFF2-40B4-BE49-F238E27FC236}">
+                <a16:creationId xmlns:a16="http://schemas.microsoft.com/office/drawing/2014/main" id="{14907A98-9E58-480E-B77F-4AD017B0D3C5}"/>
+              </a:ext>
+            </a:extLst>
+          </p:cNvPr>
+          <p:cNvSpPr/>
+          <p:nvPr/>
+        </p:nvSpPr>
+        <p:spPr>
+          <a:xfrm>
+            <a:off x="7906327" y="3409374"/>
+            <a:ext cx="1330037" cy="314036"/>
+          </a:xfrm>
+          <a:prstGeom prst="rect">
+            <a:avLst/>
+          </a:prstGeom>
+        </p:spPr>
+        <p:style>
+          <a:lnRef idx="2">
+            <a:schemeClr val="accent1">
+              <a:shade val="50000"/>
+            </a:schemeClr>
+          </a:lnRef>
+          <a:fillRef idx="1">
+            <a:schemeClr val="accent1"/>
+          </a:fillRef>
+          <a:effectRef idx="0">
+            <a:schemeClr val="accent1"/>
+          </a:effectRef>
+          <a:fontRef idx="minor">
+            <a:schemeClr val="lt1"/>
+          </a:fontRef>
+        </p:style>
+        <p:txBody>
+          <a:bodyPr rtlCol="0" anchor="ctr"/>
+          <a:lstStyle/>
+          <a:p>
+            <a:pPr algn="ctr"/>
+            <a:r>
+              <a:rPr lang="en-US" sz="1200" b="1" dirty="0"/>
+              <a:t>192.168.59.10</a:t>
+            </a:r>
+            <a:endParaRPr lang="en-US" sz="1600" b="1" dirty="0"/>
+          </a:p>
+        </p:txBody>
+      </p:sp>
+      <p:sp>
+        <p:nvSpPr>
+          <p:cNvPr id="22" name="Rectangle 21">
+            <a:extLst>
+              <a:ext uri="{FF2B5EF4-FFF2-40B4-BE49-F238E27FC236}">
+                <a16:creationId xmlns:a16="http://schemas.microsoft.com/office/drawing/2014/main" id="{D5556EF6-92F9-43E1-BFC5-667780439D58}"/>
+              </a:ext>
+            </a:extLst>
+          </p:cNvPr>
+          <p:cNvSpPr/>
+          <p:nvPr/>
+        </p:nvSpPr>
+        <p:spPr>
+          <a:xfrm>
+            <a:off x="10123054" y="3378202"/>
+            <a:ext cx="1450110" cy="314036"/>
+          </a:xfrm>
+          <a:prstGeom prst="rect">
+            <a:avLst/>
+          </a:prstGeom>
+        </p:spPr>
+        <p:style>
+          <a:lnRef idx="2">
+            <a:schemeClr val="accent1">
+              <a:shade val="50000"/>
+            </a:schemeClr>
+          </a:lnRef>
+          <a:fillRef idx="1">
+            <a:schemeClr val="accent1"/>
+          </a:fillRef>
+          <a:effectRef idx="0">
+            <a:schemeClr val="accent1"/>
+          </a:effectRef>
+          <a:fontRef idx="minor">
+            <a:schemeClr val="lt1"/>
+          </a:fontRef>
+        </p:style>
+        <p:txBody>
+          <a:bodyPr rtlCol="0" anchor="ctr"/>
+          <a:lstStyle/>
+          <a:p>
+            <a:pPr algn="ctr"/>
+            <a:r>
+              <a:rPr lang="en-US" sz="1200" b="1" dirty="0"/>
+              <a:t>192.168.63.8</a:t>
+            </a:r>
+          </a:p>
+        </p:txBody>
+      </p:sp>
+      <p:sp>
+        <p:nvSpPr>
+          <p:cNvPr id="23" name="Rectangle: Rounded Corners 22">
+            <a:extLst>
+              <a:ext uri="{FF2B5EF4-FFF2-40B4-BE49-F238E27FC236}">
+                <a16:creationId xmlns:a16="http://schemas.microsoft.com/office/drawing/2014/main" id="{27B3938C-AC6A-4A5C-B8EC-387F3F6C78BD}"/>
+              </a:ext>
+            </a:extLst>
+          </p:cNvPr>
+          <p:cNvSpPr/>
+          <p:nvPr/>
+        </p:nvSpPr>
+        <p:spPr>
+          <a:xfrm>
+            <a:off x="314036" y="1468582"/>
+            <a:ext cx="1422400" cy="1431637"/>
+          </a:xfrm>
+          <a:prstGeom prst="roundRect">
+            <a:avLst/>
+          </a:prstGeom>
+        </p:spPr>
+        <p:style>
+          <a:lnRef idx="2">
+            <a:schemeClr val="accent5">
+              <a:shade val="50000"/>
+            </a:schemeClr>
+          </a:lnRef>
+          <a:fillRef idx="1">
+            <a:schemeClr val="accent5"/>
+          </a:fillRef>
+          <a:effectRef idx="0">
+            <a:schemeClr val="accent5"/>
+          </a:effectRef>
+          <a:fontRef idx="minor">
+            <a:schemeClr val="lt1"/>
+          </a:fontRef>
+        </p:style>
+        <p:txBody>
+          <a:bodyPr rtlCol="0" anchor="ctr"/>
+          <a:lstStyle/>
+          <a:p>
+            <a:pPr algn="ctr"/>
+            <a:r>
+              <a:rPr lang="en-IN" sz="1600" dirty="0"/>
+              <a:t>Internet</a:t>
+            </a:r>
+            <a:endParaRPr lang="en-US" sz="1600" dirty="0"/>
+          </a:p>
+        </p:txBody>
+      </p:sp>
+      <p:sp>
+        <p:nvSpPr>
+          <p:cNvPr id="29" name="Rectangle 28">
+            <a:extLst>
+              <a:ext uri="{FF2B5EF4-FFF2-40B4-BE49-F238E27FC236}">
+                <a16:creationId xmlns:a16="http://schemas.microsoft.com/office/drawing/2014/main" id="{1D12CB39-952A-4BA4-9477-EE38B3E32395}"/>
+              </a:ext>
+            </a:extLst>
+          </p:cNvPr>
+          <p:cNvSpPr/>
+          <p:nvPr/>
+        </p:nvSpPr>
+        <p:spPr>
+          <a:xfrm>
+            <a:off x="7139708" y="2687780"/>
+            <a:ext cx="969819" cy="260929"/>
+          </a:xfrm>
+          <a:prstGeom prst="rect">
+            <a:avLst/>
+          </a:prstGeom>
+        </p:spPr>
+        <p:style>
+          <a:lnRef idx="2">
+            <a:schemeClr val="accent1">
+              <a:shade val="50000"/>
+            </a:schemeClr>
+          </a:lnRef>
+          <a:fillRef idx="1">
+            <a:schemeClr val="accent1"/>
+          </a:fillRef>
+          <a:effectRef idx="0">
+            <a:schemeClr val="accent1"/>
+          </a:effectRef>
+          <a:fontRef idx="minor">
+            <a:schemeClr val="lt1"/>
+          </a:fontRef>
+        </p:style>
+        <p:txBody>
+          <a:bodyPr rtlCol="0" anchor="ctr"/>
+          <a:lstStyle/>
+          <a:p>
+            <a:pPr algn="ctr"/>
+            <a:r>
+              <a:rPr lang="en-US" sz="900" b="1" dirty="0"/>
+              <a:t>13.235.48.150</a:t>
+            </a:r>
+          </a:p>
+        </p:txBody>
+      </p:sp>
+      <p:sp>
+        <p:nvSpPr>
+          <p:cNvPr id="30" name="Rectangle 29">
+            <a:extLst>
+              <a:ext uri="{FF2B5EF4-FFF2-40B4-BE49-F238E27FC236}">
+                <a16:creationId xmlns:a16="http://schemas.microsoft.com/office/drawing/2014/main" id="{30CBA9F8-ECE7-4D71-BAC0-2B5580BB1104}"/>
+              </a:ext>
+            </a:extLst>
+          </p:cNvPr>
+          <p:cNvSpPr/>
+          <p:nvPr/>
+        </p:nvSpPr>
+        <p:spPr>
+          <a:xfrm>
+            <a:off x="9864436" y="2687780"/>
+            <a:ext cx="901700" cy="260929"/>
+          </a:xfrm>
+          <a:prstGeom prst="rect">
+            <a:avLst/>
+          </a:prstGeom>
+        </p:spPr>
+        <p:style>
+          <a:lnRef idx="2">
+            <a:schemeClr val="accent1">
+              <a:shade val="50000"/>
+            </a:schemeClr>
+          </a:lnRef>
+          <a:fillRef idx="1">
+            <a:schemeClr val="accent1"/>
+          </a:fillRef>
+          <a:effectRef idx="0">
+            <a:schemeClr val="accent1"/>
+          </a:effectRef>
+          <a:fontRef idx="minor">
+            <a:schemeClr val="lt1"/>
+          </a:fontRef>
+        </p:style>
+        <p:txBody>
+          <a:bodyPr rtlCol="0" anchor="ctr"/>
+          <a:lstStyle/>
+          <a:p>
+            <a:pPr algn="ctr"/>
+            <a:r>
+              <a:rPr lang="en-US" sz="900" b="1" dirty="0"/>
+              <a:t>52.66.210.37</a:t>
+            </a:r>
+          </a:p>
+        </p:txBody>
+      </p:sp>
+      <p:sp>
+        <p:nvSpPr>
+          <p:cNvPr id="31" name="Rectangle 30">
+            <a:extLst>
+              <a:ext uri="{FF2B5EF4-FFF2-40B4-BE49-F238E27FC236}">
+                <a16:creationId xmlns:a16="http://schemas.microsoft.com/office/drawing/2014/main" id="{DA9C241F-80AA-47AF-837D-9D374DB68109}"/>
+              </a:ext>
+            </a:extLst>
+          </p:cNvPr>
+          <p:cNvSpPr/>
+          <p:nvPr/>
+        </p:nvSpPr>
+        <p:spPr>
+          <a:xfrm>
+            <a:off x="4299526" y="2827484"/>
+            <a:ext cx="1727200" cy="600363"/>
+          </a:xfrm>
+          <a:prstGeom prst="rect">
+            <a:avLst/>
+          </a:prstGeom>
+        </p:spPr>
+        <p:style>
+          <a:lnRef idx="2">
+            <a:schemeClr val="accent1">
+              <a:shade val="50000"/>
+            </a:schemeClr>
+          </a:lnRef>
+          <a:fillRef idx="1">
+            <a:schemeClr val="accent1"/>
+          </a:fillRef>
+          <a:effectRef idx="0">
+            <a:schemeClr val="accent1"/>
+          </a:effectRef>
+          <a:fontRef idx="minor">
+            <a:schemeClr val="lt1"/>
+          </a:fontRef>
+        </p:style>
+        <p:txBody>
+          <a:bodyPr rtlCol="0" anchor="ctr"/>
+          <a:lstStyle/>
+          <a:p>
+            <a:pPr algn="ctr"/>
+            <a:r>
+              <a:rPr lang="en-US" sz="1600"/>
+              <a:t>15.206.43.182</a:t>
+            </a:r>
+          </a:p>
+        </p:txBody>
+      </p:sp>
+      <p:cxnSp>
+        <p:nvCxnSpPr>
+          <p:cNvPr id="33" name="Connector: Elbow 32">
+            <a:extLst>
+              <a:ext uri="{FF2B5EF4-FFF2-40B4-BE49-F238E27FC236}">
+                <a16:creationId xmlns:a16="http://schemas.microsoft.com/office/drawing/2014/main" id="{4E076FFE-B0E1-4D86-9410-D57EECBC31BF}"/>
+              </a:ext>
+            </a:extLst>
+          </p:cNvPr>
+          <p:cNvCxnSpPr>
+            <a:cxnSpLocks/>
+            <a:stCxn id="23" idx="3"/>
+            <a:endCxn id="31" idx="1"/>
+          </p:cNvCxnSpPr>
+          <p:nvPr/>
+        </p:nvCxnSpPr>
+        <p:spPr>
+          <a:xfrm>
+            <a:off x="1736436" y="2184401"/>
+            <a:ext cx="2563090" cy="943265"/>
+          </a:xfrm>
+          <a:prstGeom prst="bentConnector3">
+            <a:avLst/>
+          </a:prstGeom>
+          <a:ln>
+            <a:tailEnd type="triangle"/>
+          </a:ln>
+        </p:spPr>
+        <p:style>
+          <a:lnRef idx="1">
+            <a:schemeClr val="accent1"/>
+          </a:lnRef>
+          <a:fillRef idx="0">
+            <a:schemeClr val="accent1"/>
+          </a:fillRef>
+          <a:effectRef idx="0">
+            <a:schemeClr val="accent1"/>
+          </a:effectRef>
+          <a:fontRef idx="minor">
+            <a:schemeClr val="tx1"/>
+          </a:fontRef>
+        </p:style>
+      </p:cxnSp>
+      <p:cxnSp>
+        <p:nvCxnSpPr>
+          <p:cNvPr id="36" name="Connector: Elbow 35">
+            <a:extLst>
+              <a:ext uri="{FF2B5EF4-FFF2-40B4-BE49-F238E27FC236}">
+                <a16:creationId xmlns:a16="http://schemas.microsoft.com/office/drawing/2014/main" id="{F73A0F92-F943-49B3-854C-59AEDF6716DF}"/>
+              </a:ext>
+            </a:extLst>
+          </p:cNvPr>
+          <p:cNvCxnSpPr>
+            <a:cxnSpLocks/>
+            <a:stCxn id="31" idx="3"/>
+            <a:endCxn id="29" idx="1"/>
+          </p:cNvCxnSpPr>
+          <p:nvPr/>
+        </p:nvCxnSpPr>
+        <p:spPr>
+          <a:xfrm flipV="1">
+            <a:off x="6026726" y="2818245"/>
+            <a:ext cx="1112982" cy="309421"/>
+          </a:xfrm>
+          <a:prstGeom prst="bentConnector3">
+            <a:avLst>
+              <a:gd name="adj1" fmla="val 50000"/>
+            </a:avLst>
+          </a:prstGeom>
+          <a:ln>
+            <a:tailEnd type="triangle"/>
+          </a:ln>
+        </p:spPr>
+        <p:style>
+          <a:lnRef idx="1">
+            <a:schemeClr val="accent1"/>
+          </a:lnRef>
+          <a:fillRef idx="0">
+            <a:schemeClr val="accent1"/>
+          </a:fillRef>
+          <a:effectRef idx="0">
+            <a:schemeClr val="accent1"/>
+          </a:effectRef>
+          <a:fontRef idx="minor">
+            <a:schemeClr val="tx1"/>
+          </a:fontRef>
+        </p:style>
+      </p:cxnSp>
+      <p:cxnSp>
+        <p:nvCxnSpPr>
+          <p:cNvPr id="38" name="Connector: Elbow 37">
+            <a:extLst>
+              <a:ext uri="{FF2B5EF4-FFF2-40B4-BE49-F238E27FC236}">
+                <a16:creationId xmlns:a16="http://schemas.microsoft.com/office/drawing/2014/main" id="{3BD3E800-B5BC-4757-81D5-C3F389CD4E71}"/>
+              </a:ext>
+            </a:extLst>
+          </p:cNvPr>
+          <p:cNvCxnSpPr>
+            <a:cxnSpLocks/>
+            <a:stCxn id="31" idx="3"/>
+            <a:endCxn id="30" idx="1"/>
+          </p:cNvCxnSpPr>
+          <p:nvPr/>
+        </p:nvCxnSpPr>
+        <p:spPr>
+          <a:xfrm flipV="1">
+            <a:off x="6026726" y="2818245"/>
+            <a:ext cx="3837710" cy="309421"/>
+          </a:xfrm>
+          <a:prstGeom prst="bentConnector3">
+            <a:avLst/>
+          </a:prstGeom>
+          <a:ln>
+            <a:tailEnd type="triangle"/>
+          </a:ln>
+        </p:spPr>
+        <p:style>
+          <a:lnRef idx="1">
+            <a:schemeClr val="accent1"/>
+          </a:lnRef>
+          <a:fillRef idx="0">
+            <a:schemeClr val="accent1"/>
+          </a:fillRef>
+          <a:effectRef idx="0">
+            <a:schemeClr val="accent1"/>
+          </a:effectRef>
+          <a:fontRef idx="minor">
+            <a:schemeClr val="tx1"/>
+          </a:fontRef>
+        </p:style>
+      </p:cxnSp>
+      <p:sp>
+        <p:nvSpPr>
+          <p:cNvPr id="40" name="Rectangle 39">
+            <a:extLst>
+              <a:ext uri="{FF2B5EF4-FFF2-40B4-BE49-F238E27FC236}">
+                <a16:creationId xmlns:a16="http://schemas.microsoft.com/office/drawing/2014/main" id="{701D9778-7B9A-46C7-B1D9-A555B058DF8B}"/>
+              </a:ext>
+            </a:extLst>
+          </p:cNvPr>
+          <p:cNvSpPr/>
+          <p:nvPr/>
+        </p:nvSpPr>
+        <p:spPr>
+          <a:xfrm>
+            <a:off x="8880763" y="4656287"/>
+            <a:ext cx="1727200" cy="1431637"/>
+          </a:xfrm>
+          <a:prstGeom prst="rect">
+            <a:avLst/>
+          </a:prstGeom>
+        </p:spPr>
+        <p:style>
+          <a:lnRef idx="2">
+            <a:schemeClr val="accent1">
+              <a:shade val="50000"/>
+            </a:schemeClr>
+          </a:lnRef>
+          <a:fillRef idx="1">
+            <a:schemeClr val="accent1"/>
+          </a:fillRef>
+          <a:effectRef idx="0">
+            <a:schemeClr val="accent1"/>
+          </a:effectRef>
+          <a:fontRef idx="minor">
+            <a:schemeClr val="lt1"/>
+          </a:fontRef>
+        </p:style>
+        <p:txBody>
+          <a:bodyPr rtlCol="0" anchor="ctr"/>
+          <a:lstStyle/>
+          <a:p>
+            <a:pPr algn="ctr"/>
+            <a:r>
+              <a:rPr lang="en-US" sz="1600" dirty="0"/>
+              <a:t>Node2</a:t>
+            </a:r>
+          </a:p>
+        </p:txBody>
+      </p:sp>
+      <p:cxnSp>
+        <p:nvCxnSpPr>
+          <p:cNvPr id="45" name="Connector: Elbow 44">
+            <a:extLst>
+              <a:ext uri="{FF2B5EF4-FFF2-40B4-BE49-F238E27FC236}">
+                <a16:creationId xmlns:a16="http://schemas.microsoft.com/office/drawing/2014/main" id="{06BEFDEC-8403-493E-A24E-08B4891E0FC0}"/>
+              </a:ext>
+            </a:extLst>
+          </p:cNvPr>
+          <p:cNvCxnSpPr>
+            <a:stCxn id="20" idx="2"/>
+            <a:endCxn id="12" idx="0"/>
+          </p:cNvCxnSpPr>
+          <p:nvPr/>
+        </p:nvCxnSpPr>
+        <p:spPr>
+          <a:xfrm rot="5400000">
+            <a:off x="8782047" y="3472298"/>
+            <a:ext cx="1924632" cy="12700"/>
+          </a:xfrm>
+          <a:prstGeom prst="bentConnector3">
+            <a:avLst/>
+          </a:prstGeom>
+          <a:ln>
+            <a:tailEnd type="triangle"/>
+          </a:ln>
+        </p:spPr>
+        <p:style>
+          <a:lnRef idx="1">
+            <a:schemeClr val="accent1"/>
+          </a:lnRef>
+          <a:fillRef idx="0">
+            <a:schemeClr val="accent1"/>
+          </a:fillRef>
+          <a:effectRef idx="0">
+            <a:schemeClr val="accent1"/>
+          </a:effectRef>
+          <a:fontRef idx="minor">
+            <a:schemeClr val="tx1"/>
+          </a:fontRef>
+        </p:style>
+      </p:cxnSp>
+      <p:cxnSp>
+        <p:nvCxnSpPr>
+          <p:cNvPr id="58" name="Connector: Elbow 57">
+            <a:extLst>
+              <a:ext uri="{FF2B5EF4-FFF2-40B4-BE49-F238E27FC236}">
+                <a16:creationId xmlns:a16="http://schemas.microsoft.com/office/drawing/2014/main" id="{21FDC3D7-46A3-4182-AE82-0BE54780EADC}"/>
+              </a:ext>
+            </a:extLst>
+          </p:cNvPr>
+          <p:cNvCxnSpPr>
+            <a:endCxn id="29" idx="3"/>
+          </p:cNvCxnSpPr>
+          <p:nvPr/>
+        </p:nvCxnSpPr>
+        <p:spPr>
+          <a:xfrm rot="5400000">
+            <a:off x="8109527" y="2818244"/>
+            <a:ext cx="1" cy="12700"/>
+          </a:xfrm>
+          <a:prstGeom prst="bentConnector4">
+            <a:avLst>
+              <a:gd name="adj1" fmla="val 35906500000"/>
+              <a:gd name="adj2" fmla="val 1800000"/>
+            </a:avLst>
+          </a:prstGeom>
+          <a:ln>
+            <a:tailEnd type="triangle"/>
+          </a:ln>
+        </p:spPr>
+        <p:style>
+          <a:lnRef idx="1">
+            <a:schemeClr val="accent1"/>
+          </a:lnRef>
+          <a:fillRef idx="0">
+            <a:schemeClr val="accent1"/>
+          </a:fillRef>
+          <a:effectRef idx="0">
+            <a:schemeClr val="accent1"/>
+          </a:effectRef>
+          <a:fontRef idx="minor">
+            <a:schemeClr val="tx1"/>
+          </a:fontRef>
+        </p:style>
+      </p:cxnSp>
+      <p:cxnSp>
+        <p:nvCxnSpPr>
+          <p:cNvPr id="60" name="Connector: Elbow 59">
+            <a:extLst>
+              <a:ext uri="{FF2B5EF4-FFF2-40B4-BE49-F238E27FC236}">
+                <a16:creationId xmlns:a16="http://schemas.microsoft.com/office/drawing/2014/main" id="{52F1A2E7-1CA6-43D0-B6D9-A5AA2619D592}"/>
+              </a:ext>
+            </a:extLst>
+          </p:cNvPr>
+          <p:cNvCxnSpPr>
+            <a:cxnSpLocks/>
+            <a:stCxn id="29" idx="3"/>
+            <a:endCxn id="21" idx="0"/>
+          </p:cNvCxnSpPr>
+          <p:nvPr/>
+        </p:nvCxnSpPr>
+        <p:spPr>
+          <a:xfrm>
+            <a:off x="8109527" y="2818245"/>
+            <a:ext cx="461819" cy="591129"/>
+          </a:xfrm>
+          <a:prstGeom prst="bentConnector2">
+            <a:avLst/>
+          </a:prstGeom>
+          <a:ln>
+            <a:tailEnd type="triangle"/>
+          </a:ln>
+        </p:spPr>
+        <p:style>
+          <a:lnRef idx="1">
+            <a:schemeClr val="accent2"/>
+          </a:lnRef>
+          <a:fillRef idx="0">
+            <a:schemeClr val="accent2"/>
+          </a:fillRef>
+          <a:effectRef idx="0">
+            <a:schemeClr val="accent2"/>
+          </a:effectRef>
+          <a:fontRef idx="minor">
+            <a:schemeClr val="tx1"/>
+          </a:fontRef>
+        </p:style>
+      </p:cxnSp>
+      <p:cxnSp>
+        <p:nvCxnSpPr>
+          <p:cNvPr id="63" name="Connector: Elbow 62">
+            <a:extLst>
+              <a:ext uri="{FF2B5EF4-FFF2-40B4-BE49-F238E27FC236}">
+                <a16:creationId xmlns:a16="http://schemas.microsoft.com/office/drawing/2014/main" id="{432C34AE-0D30-47F8-9F1F-FB2817F8E77D}"/>
+              </a:ext>
+            </a:extLst>
+          </p:cNvPr>
+          <p:cNvCxnSpPr>
+            <a:stCxn id="29" idx="3"/>
+            <a:endCxn id="22" idx="0"/>
+          </p:cNvCxnSpPr>
+          <p:nvPr/>
+        </p:nvCxnSpPr>
+        <p:spPr>
+          <a:xfrm>
+            <a:off x="8109527" y="2818245"/>
+            <a:ext cx="2738582" cy="559957"/>
+          </a:xfrm>
+          <a:prstGeom prst="bentConnector2">
+            <a:avLst/>
+          </a:prstGeom>
+          <a:ln>
+            <a:tailEnd type="triangle"/>
+          </a:ln>
+        </p:spPr>
+        <p:style>
+          <a:lnRef idx="1">
+            <a:schemeClr val="accent2"/>
+          </a:lnRef>
+          <a:fillRef idx="0">
+            <a:schemeClr val="accent2"/>
+          </a:fillRef>
+          <a:effectRef idx="0">
+            <a:schemeClr val="accent2"/>
+          </a:effectRef>
+          <a:fontRef idx="minor">
+            <a:schemeClr val="tx1"/>
+          </a:fontRef>
+        </p:style>
+      </p:cxnSp>
+      <p:sp>
+        <p:nvSpPr>
+          <p:cNvPr id="64" name="Rectangle 63">
+            <a:extLst>
+              <a:ext uri="{FF2B5EF4-FFF2-40B4-BE49-F238E27FC236}">
+                <a16:creationId xmlns:a16="http://schemas.microsoft.com/office/drawing/2014/main" id="{A459F7B8-8361-443A-8016-2FBEAC78AFC9}"/>
+              </a:ext>
+            </a:extLst>
+          </p:cNvPr>
+          <p:cNvSpPr/>
+          <p:nvPr/>
+        </p:nvSpPr>
+        <p:spPr>
+          <a:xfrm>
+            <a:off x="1043709" y="5389418"/>
+            <a:ext cx="1801091" cy="352142"/>
+          </a:xfrm>
+          <a:prstGeom prst="rect">
+            <a:avLst/>
+          </a:prstGeom>
+        </p:spPr>
+        <p:style>
+          <a:lnRef idx="2">
+            <a:schemeClr val="accent1">
+              <a:shade val="50000"/>
+            </a:schemeClr>
+          </a:lnRef>
+          <a:fillRef idx="1">
+            <a:schemeClr val="accent1"/>
+          </a:fillRef>
+          <a:effectRef idx="0">
+            <a:schemeClr val="accent1"/>
+          </a:effectRef>
+          <a:fontRef idx="minor">
+            <a:schemeClr val="lt1"/>
+          </a:fontRef>
+        </p:style>
+        <p:txBody>
+          <a:bodyPr rtlCol="0" anchor="ctr"/>
+          <a:lstStyle/>
+          <a:p>
+            <a:pPr algn="ctr"/>
+            <a:r>
+              <a:rPr lang="en-IN" dirty="0"/>
+              <a:t>Route53</a:t>
+            </a:r>
+            <a:endParaRPr lang="en-US" dirty="0"/>
+          </a:p>
+        </p:txBody>
+      </p:sp>
+      <p:cxnSp>
+        <p:nvCxnSpPr>
+          <p:cNvPr id="66" name="Connector: Elbow 65">
+            <a:extLst>
+              <a:ext uri="{FF2B5EF4-FFF2-40B4-BE49-F238E27FC236}">
+                <a16:creationId xmlns:a16="http://schemas.microsoft.com/office/drawing/2014/main" id="{6536CF9A-BE66-4CDF-9A92-28E08E909E0B}"/>
+              </a:ext>
+            </a:extLst>
+          </p:cNvPr>
+          <p:cNvCxnSpPr>
+            <a:endCxn id="64" idx="0"/>
+          </p:cNvCxnSpPr>
+          <p:nvPr/>
+        </p:nvCxnSpPr>
+        <p:spPr>
+          <a:xfrm rot="16200000" flipH="1">
+            <a:off x="262660" y="3707822"/>
+            <a:ext cx="2416463" cy="946728"/>
+          </a:xfrm>
+          <a:prstGeom prst="bentConnector3">
+            <a:avLst/>
+          </a:prstGeom>
+          <a:ln>
+            <a:tailEnd type="triangle"/>
+          </a:ln>
+        </p:spPr>
+        <p:style>
+          <a:lnRef idx="1">
+            <a:schemeClr val="accent1"/>
+          </a:lnRef>
+          <a:fillRef idx="0">
+            <a:schemeClr val="accent1"/>
+          </a:fillRef>
+          <a:effectRef idx="0">
+            <a:schemeClr val="accent1"/>
+          </a:effectRef>
+          <a:fontRef idx="minor">
+            <a:schemeClr val="tx1"/>
+          </a:fontRef>
+        </p:style>
+      </p:cxnSp>
+      <p:cxnSp>
+        <p:nvCxnSpPr>
+          <p:cNvPr id="68" name="Connector: Elbow 67">
+            <a:extLst>
+              <a:ext uri="{FF2B5EF4-FFF2-40B4-BE49-F238E27FC236}">
+                <a16:creationId xmlns:a16="http://schemas.microsoft.com/office/drawing/2014/main" id="{60A236FA-230B-4688-B2E0-14FACB7E9CB7}"/>
+              </a:ext>
+            </a:extLst>
+          </p:cNvPr>
+          <p:cNvCxnSpPr>
+            <a:stCxn id="64" idx="0"/>
+          </p:cNvCxnSpPr>
+          <p:nvPr/>
+        </p:nvCxnSpPr>
+        <p:spPr>
+          <a:xfrm rot="16200000" flipV="1">
+            <a:off x="364259" y="3809422"/>
+            <a:ext cx="2416464" cy="743528"/>
+          </a:xfrm>
+          <a:prstGeom prst="bentConnector3">
+            <a:avLst/>
+          </a:prstGeom>
+          <a:ln>
+            <a:tailEnd type="triangle"/>
+          </a:ln>
+        </p:spPr>
+        <p:style>
+          <a:lnRef idx="1">
+            <a:schemeClr val="accent1"/>
+          </a:lnRef>
+          <a:fillRef idx="0">
+            <a:schemeClr val="accent1"/>
+          </a:fillRef>
+          <a:effectRef idx="0">
+            <a:schemeClr val="accent1"/>
+          </a:effectRef>
+          <a:fontRef idx="minor">
+            <a:schemeClr val="tx1"/>
+          </a:fontRef>
+        </p:style>
+      </p:cxnSp>
+    </p:spTree>
+    <p:extLst>
+      <p:ext uri="{BB962C8B-B14F-4D97-AF65-F5344CB8AC3E}">
+        <p14:creationId xmlns:p14="http://schemas.microsoft.com/office/powerpoint/2010/main" val="3177118191"/>
       </p:ext>
     </p:extLst>
   </p:cSld>

</xml_diff>